<commit_message>
updated slides and bonus tasks
</commit_message>
<xml_diff>
--- a/slides/slides_2021.pptx
+++ b/slides/slides_2021.pptx
@@ -7773,10 +7773,10 @@
       </p:sp>
       <p:pic>
         <p:nvPicPr>
-          <p:cNvPr id="3" name="Picture 2" descr="Text&#10;&#10;Description automatically generated">
+          <p:cNvPr id="4" name="Picture 3" descr="Text&#10;&#10;Description automatically generated">
             <a:extLst>
               <a:ext uri="{FF2B5EF4-FFF2-40B4-BE49-F238E27FC236}">
-                <a16:creationId xmlns:a16="http://schemas.microsoft.com/office/drawing/2014/main" id="{D05D6EE9-C567-D345-8AAC-F7AFD5C3AB80}"/>
+                <a16:creationId xmlns:a16="http://schemas.microsoft.com/office/drawing/2014/main" id="{A263937B-63B6-A64E-A2CB-F16DDDE15398}"/>
               </a:ext>
             </a:extLst>
           </p:cNvPr>
@@ -7785,7 +7785,7 @@
           </p:cNvPicPr>
           <p:nvPr/>
         </p:nvPicPr>
-        <p:blipFill rotWithShape="1">
+        <p:blipFill>
           <a:blip r:embed="rId3">
             <a:extLst>
               <a:ext uri="{28A0092B-C50C-407E-A947-70E740481C1C}">
@@ -7793,13 +7793,14 @@
               </a:ext>
             </a:extLst>
           </a:blip>
-          <a:srcRect l="17963" t="23155" r="19190" b="7176"/>
-          <a:stretch/>
+          <a:stretch>
+            <a:fillRect/>
+          </a:stretch>
         </p:blipFill>
         <p:spPr>
           <a:xfrm>
-            <a:off x="2609820" y="2077202"/>
-            <a:ext cx="4860000" cy="3367268"/>
+            <a:off x="3136605" y="1891139"/>
+            <a:ext cx="3806430" cy="3732519"/>
           </a:xfrm>
           <a:prstGeom prst="rect">
             <a:avLst/>
@@ -7907,10 +7908,10 @@
       </p:sp>
       <p:pic>
         <p:nvPicPr>
-          <p:cNvPr id="8" name="Picture 7">
+          <p:cNvPr id="3" name="Picture 2" descr="Text&#10;&#10;Description automatically generated">
             <a:extLst>
               <a:ext uri="{FF2B5EF4-FFF2-40B4-BE49-F238E27FC236}">
-                <a16:creationId xmlns:a16="http://schemas.microsoft.com/office/drawing/2014/main" id="{83AEE46E-7F13-FF4A-B80A-9A8B40E7B31D}"/>
+                <a16:creationId xmlns:a16="http://schemas.microsoft.com/office/drawing/2014/main" id="{2E0ABE1D-B503-F945-A84C-DE92F5622F7B}"/>
               </a:ext>
             </a:extLst>
           </p:cNvPr>
@@ -7927,13 +7928,13 @@
               </a:ext>
             </a:extLst>
           </a:blip>
-          <a:srcRect l="17446" t="78412" r="35341" b="7530"/>
+          <a:srcRect l="2879" t="77113" r="2144" b="2402"/>
           <a:stretch/>
         </p:blipFill>
         <p:spPr>
           <a:xfrm>
-            <a:off x="1707177" y="2315869"/>
-            <a:ext cx="6665285" cy="1240402"/>
+            <a:off x="856034" y="2243512"/>
+            <a:ext cx="8433881" cy="1783739"/>
           </a:xfrm>
           <a:prstGeom prst="rect">
             <a:avLst/>

</xml_diff>